<commit_message>
Added Novita AI api
</commit_message>
<xml_diff>
--- a/presentations/pitch_deck.pptx
+++ b/presentations/pitch_deck.pptx
@@ -10,7 +10,6 @@
     <p:sldId id="258" r:id="rId9"/>
     <p:sldId id="259" r:id="rId10"/>
     <p:sldId id="260" r:id="rId11"/>
-    <p:sldId id="261" r:id="rId12"/>
   </p:sldIdLst>
   <p:sldSz cx="9144000" cy="6858000" type="screen4x3"/>
   <p:notesSz cx="6858000" cy="9144000"/>
@@ -3109,7 +3108,7 @@
           <a:lstStyle/>
           <a:p>
             <a:r>
-              <a:t>RemoteStack</a:t>
+              <a:t>AgroSentinel</a:t>
             </a:r>
           </a:p>
         </p:txBody>
@@ -3169,7 +3168,7 @@
           <a:lstStyle/>
           <a:p>
             <a:r>
-              <a:t>**Global payroll and compliance solutions are costly and inflexible**: Current solutions for global payroll and compliance are often expensive and difficult to scale, making it hard for companies to adapt to changing business needs and expand their remote teams globally. This limits the growth and flexibility of remote teams.</a:t>
+              <a:t>The agricultural industry struggles with inefficient supply chain management, leading to wasted resources and reduced profitability for farmers and stakeholders.</a:t>
             </a:r>
           </a:p>
         </p:txBody>
@@ -3229,28 +3228,28 @@
           <a:lstStyle/>
           <a:p>
             <a:r>
-              <a:t>Here is a clear and innovative solution:</a:t>
+              <a:t>Here is a clear and innovative solution to the problem:</a:t>
             </a:r>
           </a:p>
           <a:p/>
           <a:p>
             <a:r>
-              <a:t>- Develop a modular, cloud-based platform that offers à la carte payroll and compliance services, allowing companies to pick and choose the features they need.</a:t>
-            </a:r>
-          </a:p>
-          <a:p>
-            <a:r>
-              <a:t>- Utilize AI-powered automation to streamline processes and reduce costs, making it more affordable for businesses of all sizes.</a:t>
-            </a:r>
-          </a:p>
-          <a:p>
-            <a:r>
-              <a:t>- Implement a scalable and flexible architecture that can easily integrate with existing HR systems, enabling seamless expansion of remote teams globally. </a:t>
-            </a:r>
-          </a:p>
-          <a:p>
-            <a:r>
-              <a:t>- Offer a subscription-based model with flexible pricing tiers to accommodate the diverse needs of businesses operating in multiple countries.</a:t>
+              <a:t>- Develop a blockchain-based platform that connects farmers directly to buyers and suppliers, ensuring transparency and real-time tracking of produce.</a:t>
+            </a:r>
+          </a:p>
+          <a:p>
+            <a:r>
+              <a:t>- Implement an AI-powered predictive analytics tool to forecast demand and optimize crop yields, reducing waste and improving resource allocation.</a:t>
+            </a:r>
+          </a:p>
+          <a:p>
+            <a:r>
+              <a:t>- Integrate a digital payment system to facilitate secure and timely transactions, improving cash flow for farmers and stakeholders.</a:t>
+            </a:r>
+          </a:p>
+          <a:p>
+            <a:r>
+              <a:t>- Provide data-driven insights to farmers and stakeholders to inform decision-making and improve overall supply chain efficiency.</a:t>
             </a:r>
           </a:p>
         </p:txBody>
@@ -3310,27 +3309,32 @@
           <a:lstStyle/>
           <a:p>
             <a:r>
-              <a:t>The professional report for RemoteStack has been compiled, highlighting key competitors, market needs, and the unique angle the startup can leverage.</a:t>
-            </a:r>
-          </a:p>
-          <a:p>
-            <a:r>
-              <a:t>## Market Need</a:t>
-            </a:r>
-          </a:p>
-          <a:p>
-            <a:r>
-              <a:t>- Need for seamless communication and collaboration tools</a:t>
-            </a:r>
-          </a:p>
-          <a:p>
-            <a:r>
-              <a:t>## Unique Angle / Gap</a:t>
-            </a:r>
-          </a:p>
-          <a:p>
-            <a:r>
-              <a:t>RemoteStack can fill the gap by providing a comprehensive and user-friendly platform that simplifies remote team management, communication, and collaboration, addressing pain points in existing solutions.</a:t>
+              <a:t>## 📈 Market Need</a:t>
+            </a:r>
+          </a:p>
+          <a:p>
+            <a:r>
+              <a:t>- Increasing demand for precision agriculture solutions due to the need for sustainable farming practices.</a:t>
+            </a:r>
+          </a:p>
+          <a:p>
+            <a:r>
+              <a:t>- Need for improving supply chain management in agriculture.</a:t>
+            </a:r>
+          </a:p>
+          <a:p>
+            <a:r>
+              <a:t>## 💡 Unique Angle / Gap</a:t>
+            </a:r>
+          </a:p>
+          <a:p>
+            <a:r>
+              <a:t>- Potential gap in the market for tailored precision agriculture solutions that address the needs of specific crops or local farming communities.</a:t>
+            </a:r>
+          </a:p>
+          <a:p>
+            <a:r>
+              <a:t>- AgroSentinel could fill this gap by developing targeted technologies or services that improve farming practices, increase efficiency, and promote sustainability in its chosen areas of focus.</a:t>
             </a:r>
           </a:p>
         </p:txBody>
@@ -3395,82 +3399,17 @@
           </a:p>
           <a:p>
             <a:r>
-              <a:t>| Wisemonk | Remote team management and collaboration | - |</a:t>
-            </a:r>
-          </a:p>
-          <a:p>
-            <a:r>
-              <a:t>| Deel | Global payroll and compliance for remote teams | https://deel.com/ |</a:t>
-            </a:r>
-          </a:p>
-          <a:p>
-            <a:r>
-              <a:t>| Rippling | Workforce management and IT solutions for remote teams | https://www.rippling.com/ |</a:t>
-            </a:r>
-          </a:p>
-          <a:p>
-            <a:r>
-              <a:t>| Velocity Global | Global talent acquisition and workforce management | https://velocityglobal.com/ |</a:t>
-            </a:r>
-          </a:p>
-        </p:txBody>
-      </p:sp>
-    </p:spTree>
-  </p:cSld>
-  <p:clrMapOvr>
-    <a:masterClrMapping/>
-  </p:clrMapOvr>
-</p:sld>
-</file>
-
-<file path=ppt/slides/slide6.xml><?xml version="1.0" encoding="utf-8"?>
-<p:sld xmlns:a="http://schemas.openxmlformats.org/drawingml/2006/main" xmlns:p="http://schemas.openxmlformats.org/presentationml/2006/main" xmlns:r="http://schemas.openxmlformats.org/officeDocument/2006/relationships">
-  <p:cSld>
-    <p:spTree>
-      <p:nvGrpSpPr>
-        <p:cNvPr id="1" name=""/>
-        <p:cNvGrpSpPr/>
-        <p:nvPr/>
-      </p:nvGrpSpPr>
-      <p:grpSpPr/>
-      <p:sp>
-        <p:nvSpPr>
-          <p:cNvPr id="2" name="Title 1"/>
-          <p:cNvSpPr>
-            <a:spLocks noGrp="1"/>
-          </p:cNvSpPr>
-          <p:nvPr>
-            <p:ph type="title"/>
-          </p:nvPr>
-        </p:nvSpPr>
-        <p:spPr/>
-        <p:txBody>
-          <a:bodyPr/>
-          <a:lstStyle/>
-          <a:p>
-            <a:r>
-              <a:t>Unique Angle</a:t>
-            </a:r>
-          </a:p>
-        </p:txBody>
-      </p:sp>
-      <p:sp>
-        <p:nvSpPr>
-          <p:cNvPr id="3" name="Content Placeholder 2"/>
-          <p:cNvSpPr>
-            <a:spLocks noGrp="1"/>
-          </p:cNvSpPr>
-          <p:nvPr>
-            <p:ph idx="1"/>
-          </p:nvPr>
-        </p:nvSpPr>
-        <p:spPr/>
-        <p:txBody>
-          <a:bodyPr/>
-          <a:lstStyle/>
-          <a:p>
-            <a:r>
-              <a:t>We'll use AI + community + virtual events to dominate this space.</a:t>
+              <a:t>| AgJunction, Inc. | Precision guidance and steering solutions for agriculture | https://www.agjunction.com/ |</a:t>
+            </a:r>
+          </a:p>
+          <a:p>
+            <a:r>
+              <a:t>| Farmers Business Network | Agritech company leveraging data science for farming | https://www.farmersbusinessnetwork.com/ |</a:t>
+            </a:r>
+          </a:p>
+          <a:p>
+            <a:r>
+              <a:t>| PrecisionHawk | Drone-based precision agriculture solutions | https://www.precisionhawk.com/ |</a:t>
             </a:r>
           </a:p>
         </p:txBody>

</xml_diff>